<commit_message>
one more ppt fix
</commit_message>
<xml_diff>
--- a/presentations/Python/python_overview.pptx
+++ b/presentations/Python/python_overview.pptx
@@ -5,25 +5,24 @@
     <p:sldMasterId id="2147483648" r:id="rId1"/>
   </p:sldMasterIdLst>
   <p:notesMasterIdLst>
-    <p:notesMasterId r:id="rId15"/>
+    <p:notesMasterId r:id="rId14"/>
   </p:notesMasterIdLst>
   <p:handoutMasterIdLst>
-    <p:handoutMasterId r:id="rId16"/>
+    <p:handoutMasterId r:id="rId15"/>
   </p:handoutMasterIdLst>
   <p:sldIdLst>
     <p:sldId id="715" r:id="rId2"/>
-    <p:sldId id="1265" r:id="rId3"/>
-    <p:sldId id="1268" r:id="rId4"/>
-    <p:sldId id="1269" r:id="rId5"/>
-    <p:sldId id="1270" r:id="rId6"/>
-    <p:sldId id="1271" r:id="rId7"/>
-    <p:sldId id="1272" r:id="rId8"/>
-    <p:sldId id="1273" r:id="rId9"/>
-    <p:sldId id="1274" r:id="rId10"/>
-    <p:sldId id="1275" r:id="rId11"/>
-    <p:sldId id="1276" r:id="rId12"/>
-    <p:sldId id="1277" r:id="rId13"/>
-    <p:sldId id="1278" r:id="rId14"/>
+    <p:sldId id="1268" r:id="rId3"/>
+    <p:sldId id="1269" r:id="rId4"/>
+    <p:sldId id="1270" r:id="rId5"/>
+    <p:sldId id="1271" r:id="rId6"/>
+    <p:sldId id="1272" r:id="rId7"/>
+    <p:sldId id="1273" r:id="rId8"/>
+    <p:sldId id="1274" r:id="rId9"/>
+    <p:sldId id="1275" r:id="rId10"/>
+    <p:sldId id="1276" r:id="rId11"/>
+    <p:sldId id="1277" r:id="rId12"/>
+    <p:sldId id="1278" r:id="rId13"/>
   </p:sldIdLst>
   <p:sldSz cx="12192000" cy="6858000"/>
   <p:notesSz cx="6950075" cy="9236075"/>
@@ -258,14 +257,14 @@
           <a:effectLst/>
           <a:extLst>
             <a:ext uri="{909E8E84-426E-40dd-AFC4-6F175D3DCCD1}">
-              <a14:hiddenFill xmlns="" xmlns:a14="http://schemas.microsoft.com/office/drawing/2010/main">
+              <a14:hiddenFill xmlns:a14="http://schemas.microsoft.com/office/drawing/2010/main" xmlns="">
                 <a:solidFill>
                   <a:schemeClr val="accent1"/>
                 </a:solidFill>
               </a14:hiddenFill>
             </a:ext>
             <a:ext uri="{91240B29-F687-4f45-9708-019B960494DF}">
-              <a14:hiddenLine xmlns="" xmlns:a14="http://schemas.microsoft.com/office/drawing/2010/main" w="12700">
+              <a14:hiddenLine xmlns:a14="http://schemas.microsoft.com/office/drawing/2010/main" xmlns="" w="12700">
                 <a:solidFill>
                   <a:schemeClr val="tx1"/>
                 </a:solidFill>
@@ -275,7 +274,7 @@
               </a14:hiddenLine>
             </a:ext>
             <a:ext uri="{AF507438-7753-43e0-B8FC-AC1667EBCBE1}">
-              <a14:hiddenEffects xmlns="" xmlns:a14="http://schemas.microsoft.com/office/drawing/2010/main">
+              <a14:hiddenEffects xmlns:a14="http://schemas.microsoft.com/office/drawing/2010/main" xmlns="">
                 <a:effectLst>
                   <a:outerShdw blurRad="63500" dist="38099" dir="2700000" algn="ctr" rotWithShape="0">
                     <a:schemeClr val="bg2">
@@ -286,7 +285,7 @@
               </a14:hiddenEffects>
             </a:ext>
             <a:ext uri="{FAA26D3D-D897-4be2-8F04-BA451C77F1D7}">
-              <ma14:placeholderFlag xmlns="" xmlns:ma14="http://schemas.microsoft.com/office/mac/drawingml/2011/main" val="1"/>
+              <ma14:placeholderFlag xmlns:ma14="http://schemas.microsoft.com/office/mac/drawingml/2011/main" xmlns="" val="1"/>
             </a:ext>
           </a:extLst>
         </p:spPr>
@@ -364,12 +363,12 @@
           <a:effectLst/>
           <a:extLst>
             <a:ext uri="{909E8E84-426E-40dd-AFC4-6F175D3DCCD1}">
-              <a14:hiddenFill xmlns="" xmlns:a14="http://schemas.microsoft.com/office/drawing/2010/main">
+              <a14:hiddenFill xmlns:a14="http://schemas.microsoft.com/office/drawing/2010/main" xmlns="">
                 <a:noFill/>
               </a14:hiddenFill>
             </a:ext>
             <a:ext uri="{AF507438-7753-43e0-B8FC-AC1667EBCBE1}">
-              <a14:hiddenEffects xmlns="" xmlns:a14="http://schemas.microsoft.com/office/drawing/2010/main">
+              <a14:hiddenEffects xmlns:a14="http://schemas.microsoft.com/office/drawing/2010/main" xmlns="">
                 <a:effectLst>
                   <a:outerShdw blurRad="63500" dist="38099" dir="2700000" algn="ctr" rotWithShape="0">
                     <a:srgbClr val="000000">
@@ -380,7 +379,7 @@
               </a14:hiddenEffects>
             </a:ext>
             <a:ext uri="{53640926-AAD7-44d8-BBD7-CCE9431645EC}">
-              <a14:shadowObscured xmlns="" xmlns:a14="http://schemas.microsoft.com/office/drawing/2010/main" val="1"/>
+              <a14:shadowObscured xmlns:a14="http://schemas.microsoft.com/office/drawing/2010/main" xmlns="" val="1"/>
             </a:ext>
           </a:extLst>
         </p:spPr>
@@ -789,14 +788,14 @@
           <a:effectLst/>
           <a:extLst>
             <a:ext uri="{909E8E84-426E-40dd-AFC4-6F175D3DCCD1}">
-              <a14:hiddenFill xmlns="" xmlns:a14="http://schemas.microsoft.com/office/drawing/2010/main">
+              <a14:hiddenFill xmlns:a14="http://schemas.microsoft.com/office/drawing/2010/main" xmlns="">
                 <a:solidFill>
                   <a:schemeClr val="accent1"/>
                 </a:solidFill>
               </a14:hiddenFill>
             </a:ext>
             <a:ext uri="{91240B29-F687-4f45-9708-019B960494DF}">
-              <a14:hiddenLine xmlns="" xmlns:a14="http://schemas.microsoft.com/office/drawing/2010/main" w="12700">
+              <a14:hiddenLine xmlns:a14="http://schemas.microsoft.com/office/drawing/2010/main" xmlns="" w="12700">
                 <a:solidFill>
                   <a:schemeClr val="tx1"/>
                 </a:solidFill>
@@ -806,7 +805,7 @@
               </a14:hiddenLine>
             </a:ext>
             <a:ext uri="{AF507438-7753-43e0-B8FC-AC1667EBCBE1}">
-              <a14:hiddenEffects xmlns="" xmlns:a14="http://schemas.microsoft.com/office/drawing/2010/main">
+              <a14:hiddenEffects xmlns:a14="http://schemas.microsoft.com/office/drawing/2010/main" xmlns="">
                 <a:effectLst>
                   <a:outerShdw blurRad="63500" dist="38099" dir="2700000" algn="ctr" rotWithShape="0">
                     <a:schemeClr val="bg2">
@@ -961,14 +960,14 @@
           </a:ln>
           <a:extLst>
             <a:ext uri="{909E8E84-426E-40dd-AFC4-6F175D3DCCD1}">
-              <a14:hiddenFill xmlns="" xmlns:a14="http://schemas.microsoft.com/office/drawing/2010/main">
+              <a14:hiddenFill xmlns:a14="http://schemas.microsoft.com/office/drawing/2010/main" xmlns="">
                 <a:solidFill>
                   <a:srgbClr val="FFFFFF"/>
                 </a:solidFill>
               </a14:hiddenFill>
             </a:ext>
             <a:ext uri="{91240B29-F687-4f45-9708-019B960494DF}">
-              <a14:hiddenLine xmlns="" xmlns:a14="http://schemas.microsoft.com/office/drawing/2010/main" w="9525">
+              <a14:hiddenLine xmlns:a14="http://schemas.microsoft.com/office/drawing/2010/main" xmlns="" w="9525">
                 <a:solidFill>
                   <a:srgbClr val="000000"/>
                 </a:solidFill>
@@ -2547,14 +2546,14 @@
           <a:effectLst/>
           <a:extLst>
             <a:ext uri="{909E8E84-426E-40dd-AFC4-6F175D3DCCD1}">
-              <a14:hiddenFill xmlns="" xmlns:a14="http://schemas.microsoft.com/office/drawing/2010/main">
+              <a14:hiddenFill xmlns:a14="http://schemas.microsoft.com/office/drawing/2010/main" xmlns="">
                 <a:solidFill>
                   <a:schemeClr val="accent1"/>
                 </a:solidFill>
               </a14:hiddenFill>
             </a:ext>
             <a:ext uri="{91240B29-F687-4f45-9708-019B960494DF}">
-              <a14:hiddenLine xmlns="" xmlns:a14="http://schemas.microsoft.com/office/drawing/2010/main" w="12700">
+              <a14:hiddenLine xmlns:a14="http://schemas.microsoft.com/office/drawing/2010/main" xmlns="" w="12700">
                 <a:solidFill>
                   <a:schemeClr val="tx1"/>
                 </a:solidFill>
@@ -2564,7 +2563,7 @@
               </a14:hiddenLine>
             </a:ext>
             <a:ext uri="{AF507438-7753-43e0-B8FC-AC1667EBCBE1}">
-              <a14:hiddenEffects xmlns="" xmlns:a14="http://schemas.microsoft.com/office/drawing/2010/main">
+              <a14:hiddenEffects xmlns:a14="http://schemas.microsoft.com/office/drawing/2010/main" xmlns="">
                 <a:effectLst>
                   <a:outerShdw blurRad="63500" dist="38099" dir="2700000" algn="ctr" rotWithShape="0">
                     <a:schemeClr val="bg2">
@@ -2575,7 +2574,7 @@
               </a14:hiddenEffects>
             </a:ext>
             <a:ext uri="{FAA26D3D-D897-4be2-8F04-BA451C77F1D7}">
-              <ma14:placeholderFlag xmlns="" xmlns:ma14="http://schemas.microsoft.com/office/mac/drawingml/2011/main" val="1"/>
+              <ma14:placeholderFlag xmlns:ma14="http://schemas.microsoft.com/office/mac/drawingml/2011/main" xmlns="" val="1"/>
             </a:ext>
           </a:extLst>
         </p:spPr>
@@ -2620,14 +2619,14 @@
           <a:effectLst/>
           <a:extLst>
             <a:ext uri="{909E8E84-426E-40dd-AFC4-6F175D3DCCD1}">
-              <a14:hiddenFill xmlns="" xmlns:a14="http://schemas.microsoft.com/office/drawing/2010/main">
+              <a14:hiddenFill xmlns:a14="http://schemas.microsoft.com/office/drawing/2010/main" xmlns="">
                 <a:solidFill>
                   <a:schemeClr val="accent1"/>
                 </a:solidFill>
               </a14:hiddenFill>
             </a:ext>
             <a:ext uri="{91240B29-F687-4f45-9708-019B960494DF}">
-              <a14:hiddenLine xmlns="" xmlns:a14="http://schemas.microsoft.com/office/drawing/2010/main" w="12700">
+              <a14:hiddenLine xmlns:a14="http://schemas.microsoft.com/office/drawing/2010/main" xmlns="" w="12700">
                 <a:solidFill>
                   <a:schemeClr val="tx1"/>
                 </a:solidFill>
@@ -2637,7 +2636,7 @@
               </a14:hiddenLine>
             </a:ext>
             <a:ext uri="{AF507438-7753-43e0-B8FC-AC1667EBCBE1}">
-              <a14:hiddenEffects xmlns="" xmlns:a14="http://schemas.microsoft.com/office/drawing/2010/main">
+              <a14:hiddenEffects xmlns:a14="http://schemas.microsoft.com/office/drawing/2010/main" xmlns="">
                 <a:effectLst>
                   <a:outerShdw blurRad="63500" dist="38099" dir="2700000" algn="ctr" rotWithShape="0">
                     <a:schemeClr val="bg2">
@@ -2648,7 +2647,7 @@
               </a14:hiddenEffects>
             </a:ext>
             <a:ext uri="{FAA26D3D-D897-4be2-8F04-BA451C77F1D7}">
-              <ma14:placeholderFlag xmlns="" xmlns:ma14="http://schemas.microsoft.com/office/mac/drawingml/2011/main" val="1"/>
+              <ma14:placeholderFlag xmlns:ma14="http://schemas.microsoft.com/office/mac/drawingml/2011/main" xmlns="" val="1"/>
             </a:ext>
           </a:extLst>
         </p:spPr>
@@ -2732,14 +2731,14 @@
           </a:ln>
           <a:extLst>
             <a:ext uri="{909E8E84-426E-40dd-AFC4-6F175D3DCCD1}">
-              <a14:hiddenFill xmlns="" xmlns:a14="http://schemas.microsoft.com/office/drawing/2010/main">
+              <a14:hiddenFill xmlns:a14="http://schemas.microsoft.com/office/drawing/2010/main" xmlns="">
                 <a:solidFill>
                   <a:srgbClr val="FFFFFF"/>
                 </a:solidFill>
               </a14:hiddenFill>
             </a:ext>
             <a:ext uri="{91240B29-F687-4f45-9708-019B960494DF}">
-              <a14:hiddenLine xmlns="" xmlns:a14="http://schemas.microsoft.com/office/drawing/2010/main" w="9525">
+              <a14:hiddenLine xmlns:a14="http://schemas.microsoft.com/office/drawing/2010/main" xmlns="" w="9525">
                 <a:solidFill>
                   <a:srgbClr val="000000"/>
                 </a:solidFill>
@@ -3360,14 +3359,14 @@
           </a:ln>
           <a:extLst>
             <a:ext uri="{909E8E84-426E-40dd-AFC4-6F175D3DCCD1}">
-              <a14:hiddenFill xmlns:a14="http://schemas.microsoft.com/office/drawing/2010/main" xmlns="">
+              <a14:hiddenFill xmlns="" xmlns:a14="http://schemas.microsoft.com/office/drawing/2010/main">
                 <a:solidFill>
                   <a:srgbClr val="FFFFFF"/>
                 </a:solidFill>
               </a14:hiddenFill>
             </a:ext>
             <a:ext uri="{91240B29-F687-4f45-9708-019B960494DF}">
-              <a14:hiddenLine xmlns:a14="http://schemas.microsoft.com/office/drawing/2010/main" xmlns="" w="9525">
+              <a14:hiddenLine xmlns="" xmlns:a14="http://schemas.microsoft.com/office/drawing/2010/main" w="9525">
                 <a:solidFill>
                   <a:srgbClr val="000000"/>
                 </a:solidFill>
@@ -3443,136 +3442,6 @@
           <p:cNvPr id="2" name="Title 1">
             <a:extLst>
               <a:ext uri="{FF2B5EF4-FFF2-40B4-BE49-F238E27FC236}">
-                <a16:creationId xmlns:a16="http://schemas.microsoft.com/office/drawing/2014/main" id="{121FA7EB-5782-CA4C-8737-787B42067F97}"/>
-              </a:ext>
-            </a:extLst>
-          </p:cNvPr>
-          <p:cNvSpPr>
-            <a:spLocks noGrp="1"/>
-          </p:cNvSpPr>
-          <p:nvPr>
-            <p:ph type="title"/>
-          </p:nvPr>
-        </p:nvSpPr>
-        <p:spPr/>
-        <p:txBody>
-          <a:bodyPr/>
-          <a:lstStyle/>
-          <a:p>
-            <a:r>
-              <a:rPr lang="en-US" dirty="0"/>
-              <a:t>Disadvantages</a:t>
-            </a:r>
-          </a:p>
-        </p:txBody>
-      </p:sp>
-      <p:sp>
-        <p:nvSpPr>
-          <p:cNvPr id="3" name="Content Placeholder 2">
-            <a:extLst>
-              <a:ext uri="{FF2B5EF4-FFF2-40B4-BE49-F238E27FC236}">
-                <a16:creationId xmlns:a16="http://schemas.microsoft.com/office/drawing/2014/main" id="{44BE3BBB-EE87-434D-8732-B52785401FCF}"/>
-              </a:ext>
-            </a:extLst>
-          </p:cNvPr>
-          <p:cNvSpPr>
-            <a:spLocks noGrp="1"/>
-          </p:cNvSpPr>
-          <p:nvPr>
-            <p:ph idx="1"/>
-          </p:nvPr>
-        </p:nvSpPr>
-        <p:spPr/>
-        <p:txBody>
-          <a:bodyPr/>
-          <a:lstStyle/>
-          <a:p>
-            <a:r>
-              <a:rPr lang="en-US" dirty="0"/>
-              <a:t>Can be slower than other languages </a:t>
-            </a:r>
-          </a:p>
-          <a:p>
-            <a:pPr lvl="1"/>
-            <a:r>
-              <a:rPr lang="en-US" dirty="0"/>
-              <a:t>Flexibility comes at a cost of overhead</a:t>
-            </a:r>
-          </a:p>
-          <a:p>
-            <a:r>
-              <a:rPr lang="en-US" dirty="0"/>
-              <a:t>Somewhat decentralized; changes frequently</a:t>
-            </a:r>
-          </a:p>
-          <a:p>
-            <a:r>
-              <a:rPr lang="en-US" dirty="0"/>
-              <a:t>Installation/Hard to get started</a:t>
-            </a:r>
-          </a:p>
-          <a:p>
-            <a:r>
-              <a:rPr lang="en-US" dirty="0"/>
-              <a:t>Easy to write bad code</a:t>
-            </a:r>
-          </a:p>
-          <a:p>
-            <a:pPr lvl="1"/>
-            <a:r>
-              <a:rPr lang="en-US" b="0" dirty="0">
-                <a:hlinkClick r:id="rId2">
-                  <a:extLst>
-                    <a:ext uri="{A12FA001-AC4F-418D-AE19-62706E023703}">
-                      <ahyp:hlinkClr xmlns:ahyp="http://schemas.microsoft.com/office/drawing/2018/hyperlinkcolor" val="tx"/>
-                    </a:ext>
-                  </a:extLst>
-                </a:hlinkClick>
-              </a:rPr>
-              <a:t>https://towardsdatascience.com/5-reasons-why-jupyter-notebooks-suck-4dc201e27086</a:t>
-            </a:r>
-            <a:endParaRPr lang="en-US" b="0" dirty="0"/>
-          </a:p>
-          <a:p>
-            <a:endParaRPr lang="en-US" dirty="0"/>
-          </a:p>
-        </p:txBody>
-      </p:sp>
-    </p:spTree>
-    <p:extLst>
-      <p:ext uri="{BB962C8B-B14F-4D97-AF65-F5344CB8AC3E}">
-        <p14:creationId xmlns:p14="http://schemas.microsoft.com/office/powerpoint/2010/main" val="2593999152"/>
-      </p:ext>
-    </p:extLst>
-  </p:cSld>
-  <p:clrMapOvr>
-    <a:masterClrMapping/>
-  </p:clrMapOvr>
-</p:sld>
-</file>
-
-<file path=ppt/slides/slide11.xml><?xml version="1.0" encoding="utf-8"?>
-<p:sld xmlns:a="http://schemas.openxmlformats.org/drawingml/2006/main" xmlns:r="http://schemas.openxmlformats.org/officeDocument/2006/relationships" xmlns:p="http://schemas.openxmlformats.org/presentationml/2006/main">
-  <p:cSld>
-    <p:spTree>
-      <p:nvGrpSpPr>
-        <p:cNvPr id="1" name=""/>
-        <p:cNvGrpSpPr/>
-        <p:nvPr/>
-      </p:nvGrpSpPr>
-      <p:grpSpPr>
-        <a:xfrm>
-          <a:off x="0" y="0"/>
-          <a:ext cx="0" cy="0"/>
-          <a:chOff x="0" y="0"/>
-          <a:chExt cx="0" cy="0"/>
-        </a:xfrm>
-      </p:grpSpPr>
-      <p:sp>
-        <p:nvSpPr>
-          <p:cNvPr id="2" name="Title 1">
-            <a:extLst>
-              <a:ext uri="{FF2B5EF4-FFF2-40B4-BE49-F238E27FC236}">
                 <a16:creationId xmlns:a16="http://schemas.microsoft.com/office/drawing/2014/main" id="{C048A38A-156F-994F-8EF8-DCB802BD381E}"/>
               </a:ext>
             </a:extLst>
@@ -3645,7 +3514,7 @@
 </p:sld>
 </file>
 
-<file path=ppt/slides/slide12.xml><?xml version="1.0" encoding="utf-8"?>
+<file path=ppt/slides/slide11.xml><?xml version="1.0" encoding="utf-8"?>
 <p:sld xmlns:a="http://schemas.openxmlformats.org/drawingml/2006/main" xmlns:r="http://schemas.openxmlformats.org/officeDocument/2006/relationships" xmlns:p="http://schemas.openxmlformats.org/presentationml/2006/main">
   <p:cSld>
     <p:spTree>
@@ -3756,7 +3625,7 @@
 </p:sld>
 </file>
 
-<file path=ppt/slides/slide13.xml><?xml version="1.0" encoding="utf-8"?>
+<file path=ppt/slides/slide12.xml><?xml version="1.0" encoding="utf-8"?>
 <p:sld xmlns:a="http://schemas.openxmlformats.org/drawingml/2006/main" xmlns:r="http://schemas.openxmlformats.org/officeDocument/2006/relationships" xmlns:p="http://schemas.openxmlformats.org/presentationml/2006/main">
   <p:cSld>
     <p:spTree>
@@ -3928,93 +3797,6 @@
       </p:grpSpPr>
       <p:sp>
         <p:nvSpPr>
-          <p:cNvPr id="2" name="Title 1">
-            <a:extLst>
-              <a:ext uri="{FF2B5EF4-FFF2-40B4-BE49-F238E27FC236}">
-                <a16:creationId xmlns:a16="http://schemas.microsoft.com/office/drawing/2014/main" id="{CCF61C36-E100-424D-8200-54D6E29EED15}"/>
-              </a:ext>
-            </a:extLst>
-          </p:cNvPr>
-          <p:cNvSpPr>
-            <a:spLocks noGrp="1"/>
-          </p:cNvSpPr>
-          <p:nvPr>
-            <p:ph type="title"/>
-          </p:nvPr>
-        </p:nvSpPr>
-        <p:spPr/>
-        <p:txBody>
-          <a:bodyPr/>
-          <a:lstStyle/>
-          <a:p>
-            <a:r>
-              <a:rPr lang="en-US" dirty="0"/>
-              <a:t>MODFLOW 6 Unstructured Grids</a:t>
-            </a:r>
-            <a:br>
-              <a:rPr lang="en-US" dirty="0"/>
-            </a:br>
-            <a:endParaRPr lang="en-US" dirty="0"/>
-          </a:p>
-        </p:txBody>
-      </p:sp>
-      <p:sp>
-        <p:nvSpPr>
-          <p:cNvPr id="3" name="Text Placeholder 2">
-            <a:extLst>
-              <a:ext uri="{FF2B5EF4-FFF2-40B4-BE49-F238E27FC236}">
-                <a16:creationId xmlns:a16="http://schemas.microsoft.com/office/drawing/2014/main" id="{30C2C7A8-3A8F-7841-B180-AB197FE47517}"/>
-              </a:ext>
-            </a:extLst>
-          </p:cNvPr>
-          <p:cNvSpPr>
-            <a:spLocks noGrp="1"/>
-          </p:cNvSpPr>
-          <p:nvPr>
-            <p:ph type="body" idx="1"/>
-          </p:nvPr>
-        </p:nvSpPr>
-        <p:spPr/>
-        <p:txBody>
-          <a:bodyPr/>
-          <a:lstStyle/>
-          <a:p>
-            <a:endParaRPr lang="en-US" dirty="0"/>
-          </a:p>
-        </p:txBody>
-      </p:sp>
-    </p:spTree>
-    <p:extLst>
-      <p:ext uri="{BB962C8B-B14F-4D97-AF65-F5344CB8AC3E}">
-        <p14:creationId xmlns:p14="http://schemas.microsoft.com/office/powerpoint/2010/main" val="400757534"/>
-      </p:ext>
-    </p:extLst>
-  </p:cSld>
-  <p:clrMapOvr>
-    <a:masterClrMapping/>
-  </p:clrMapOvr>
-</p:sld>
-</file>
-
-<file path=ppt/slides/slide3.xml><?xml version="1.0" encoding="utf-8"?>
-<p:sld xmlns:a="http://schemas.openxmlformats.org/drawingml/2006/main" xmlns:r="http://schemas.openxmlformats.org/officeDocument/2006/relationships" xmlns:p="http://schemas.openxmlformats.org/presentationml/2006/main">
-  <p:cSld>
-    <p:spTree>
-      <p:nvGrpSpPr>
-        <p:cNvPr id="1" name=""/>
-        <p:cNvGrpSpPr/>
-        <p:nvPr/>
-      </p:nvGrpSpPr>
-      <p:grpSpPr>
-        <a:xfrm>
-          <a:off x="0" y="0"/>
-          <a:ext cx="0" cy="0"/>
-          <a:chOff x="0" y="0"/>
-          <a:chExt cx="0" cy="0"/>
-        </a:xfrm>
-      </p:grpSpPr>
-      <p:sp>
-        <p:nvSpPr>
           <p:cNvPr id="2" name="Title 1"/>
           <p:cNvSpPr>
             <a:spLocks noGrp="1"/>
@@ -4093,7 +3875,7 @@
 </p:sld>
 </file>
 
-<file path=ppt/slides/slide4.xml><?xml version="1.0" encoding="utf-8"?>
+<file path=ppt/slides/slide3.xml><?xml version="1.0" encoding="utf-8"?>
 <p:sld xmlns:a="http://schemas.openxmlformats.org/drawingml/2006/main" xmlns:r="http://schemas.openxmlformats.org/officeDocument/2006/relationships" xmlns:p="http://schemas.openxmlformats.org/presentationml/2006/main">
   <p:cSld>
     <p:spTree>
@@ -4332,7 +4114,7 @@
 </p:sld>
 </file>
 
-<file path=ppt/slides/slide5.xml><?xml version="1.0" encoding="utf-8"?>
+<file path=ppt/slides/slide4.xml><?xml version="1.0" encoding="utf-8"?>
 <p:sld xmlns:a="http://schemas.openxmlformats.org/drawingml/2006/main" xmlns:r="http://schemas.openxmlformats.org/officeDocument/2006/relationships" xmlns:p="http://schemas.openxmlformats.org/presentationml/2006/main">
   <p:cSld>
     <p:spTree>
@@ -4538,7 +4320,7 @@
 </p:sld>
 </file>
 
-<file path=ppt/slides/slide6.xml><?xml version="1.0" encoding="utf-8"?>
+<file path=ppt/slides/slide5.xml><?xml version="1.0" encoding="utf-8"?>
 <p:sld xmlns:a="http://schemas.openxmlformats.org/drawingml/2006/main" xmlns:r="http://schemas.openxmlformats.org/officeDocument/2006/relationships" xmlns:p="http://schemas.openxmlformats.org/presentationml/2006/main">
   <p:cSld>
     <p:spTree>
@@ -4748,7 +4530,7 @@
 </p:sld>
 </file>
 
-<file path=ppt/slides/slide7.xml><?xml version="1.0" encoding="utf-8"?>
+<file path=ppt/slides/slide6.xml><?xml version="1.0" encoding="utf-8"?>
 <p:sld xmlns:a="http://schemas.openxmlformats.org/drawingml/2006/main" xmlns:r="http://schemas.openxmlformats.org/officeDocument/2006/relationships" xmlns:p="http://schemas.openxmlformats.org/presentationml/2006/main">
   <p:cSld>
     <p:spTree>
@@ -4887,7 +4669,7 @@
 </p:sld>
 </file>
 
-<file path=ppt/slides/slide8.xml><?xml version="1.0" encoding="utf-8"?>
+<file path=ppt/slides/slide7.xml><?xml version="1.0" encoding="utf-8"?>
 <p:sld xmlns:a="http://schemas.openxmlformats.org/drawingml/2006/main" xmlns:r="http://schemas.openxmlformats.org/officeDocument/2006/relationships" xmlns:p="http://schemas.openxmlformats.org/presentationml/2006/main">
   <p:cSld>
     <p:spTree>
@@ -5046,7 +4828,7 @@
 </p:sld>
 </file>
 
-<file path=ppt/slides/slide9.xml><?xml version="1.0" encoding="utf-8"?>
+<file path=ppt/slides/slide8.xml><?xml version="1.0" encoding="utf-8"?>
 <p:sld xmlns:a="http://schemas.openxmlformats.org/drawingml/2006/main" xmlns:r="http://schemas.openxmlformats.org/officeDocument/2006/relationships" xmlns:p="http://schemas.openxmlformats.org/presentationml/2006/main">
   <p:cSld>
     <p:spTree>
@@ -5177,6 +4959,136 @@
     <p:extLst>
       <p:ext uri="{BB962C8B-B14F-4D97-AF65-F5344CB8AC3E}">
         <p14:creationId xmlns:p14="http://schemas.microsoft.com/office/powerpoint/2010/main" val="1950659919"/>
+      </p:ext>
+    </p:extLst>
+  </p:cSld>
+  <p:clrMapOvr>
+    <a:masterClrMapping/>
+  </p:clrMapOvr>
+</p:sld>
+</file>
+
+<file path=ppt/slides/slide9.xml><?xml version="1.0" encoding="utf-8"?>
+<p:sld xmlns:a="http://schemas.openxmlformats.org/drawingml/2006/main" xmlns:r="http://schemas.openxmlformats.org/officeDocument/2006/relationships" xmlns:p="http://schemas.openxmlformats.org/presentationml/2006/main">
+  <p:cSld>
+    <p:spTree>
+      <p:nvGrpSpPr>
+        <p:cNvPr id="1" name=""/>
+        <p:cNvGrpSpPr/>
+        <p:nvPr/>
+      </p:nvGrpSpPr>
+      <p:grpSpPr>
+        <a:xfrm>
+          <a:off x="0" y="0"/>
+          <a:ext cx="0" cy="0"/>
+          <a:chOff x="0" y="0"/>
+          <a:chExt cx="0" cy="0"/>
+        </a:xfrm>
+      </p:grpSpPr>
+      <p:sp>
+        <p:nvSpPr>
+          <p:cNvPr id="2" name="Title 1">
+            <a:extLst>
+              <a:ext uri="{FF2B5EF4-FFF2-40B4-BE49-F238E27FC236}">
+                <a16:creationId xmlns:a16="http://schemas.microsoft.com/office/drawing/2014/main" id="{121FA7EB-5782-CA4C-8737-787B42067F97}"/>
+              </a:ext>
+            </a:extLst>
+          </p:cNvPr>
+          <p:cNvSpPr>
+            <a:spLocks noGrp="1"/>
+          </p:cNvSpPr>
+          <p:nvPr>
+            <p:ph type="title"/>
+          </p:nvPr>
+        </p:nvSpPr>
+        <p:spPr/>
+        <p:txBody>
+          <a:bodyPr/>
+          <a:lstStyle/>
+          <a:p>
+            <a:r>
+              <a:rPr lang="en-US" dirty="0"/>
+              <a:t>Disadvantages</a:t>
+            </a:r>
+          </a:p>
+        </p:txBody>
+      </p:sp>
+      <p:sp>
+        <p:nvSpPr>
+          <p:cNvPr id="3" name="Content Placeholder 2">
+            <a:extLst>
+              <a:ext uri="{FF2B5EF4-FFF2-40B4-BE49-F238E27FC236}">
+                <a16:creationId xmlns:a16="http://schemas.microsoft.com/office/drawing/2014/main" id="{44BE3BBB-EE87-434D-8732-B52785401FCF}"/>
+              </a:ext>
+            </a:extLst>
+          </p:cNvPr>
+          <p:cNvSpPr>
+            <a:spLocks noGrp="1"/>
+          </p:cNvSpPr>
+          <p:nvPr>
+            <p:ph idx="1"/>
+          </p:nvPr>
+        </p:nvSpPr>
+        <p:spPr/>
+        <p:txBody>
+          <a:bodyPr/>
+          <a:lstStyle/>
+          <a:p>
+            <a:r>
+              <a:rPr lang="en-US" dirty="0"/>
+              <a:t>Can be slower than other languages </a:t>
+            </a:r>
+          </a:p>
+          <a:p>
+            <a:pPr lvl="1"/>
+            <a:r>
+              <a:rPr lang="en-US" dirty="0"/>
+              <a:t>Flexibility comes at a cost of overhead</a:t>
+            </a:r>
+          </a:p>
+          <a:p>
+            <a:r>
+              <a:rPr lang="en-US" dirty="0"/>
+              <a:t>Somewhat decentralized; changes frequently</a:t>
+            </a:r>
+          </a:p>
+          <a:p>
+            <a:r>
+              <a:rPr lang="en-US" dirty="0"/>
+              <a:t>Installation/Hard to get started</a:t>
+            </a:r>
+          </a:p>
+          <a:p>
+            <a:r>
+              <a:rPr lang="en-US" dirty="0"/>
+              <a:t>Easy to write bad code</a:t>
+            </a:r>
+          </a:p>
+          <a:p>
+            <a:pPr lvl="1"/>
+            <a:r>
+              <a:rPr lang="en-US" b="0" dirty="0">
+                <a:hlinkClick r:id="rId2">
+                  <a:extLst>
+                    <a:ext uri="{A12FA001-AC4F-418D-AE19-62706E023703}">
+                      <ahyp:hlinkClr xmlns:ahyp="http://schemas.microsoft.com/office/drawing/2018/hyperlinkcolor" val="tx"/>
+                    </a:ext>
+                  </a:extLst>
+                </a:hlinkClick>
+              </a:rPr>
+              <a:t>https://towardsdatascience.com/5-reasons-why-jupyter-notebooks-suck-4dc201e27086</a:t>
+            </a:r>
+            <a:endParaRPr lang="en-US" b="0" dirty="0"/>
+          </a:p>
+          <a:p>
+            <a:endParaRPr lang="en-US" dirty="0"/>
+          </a:p>
+        </p:txBody>
+      </p:sp>
+    </p:spTree>
+    <p:extLst>
+      <p:ext uri="{BB962C8B-B14F-4D97-AF65-F5344CB8AC3E}">
+        <p14:creationId xmlns:p14="http://schemas.microsoft.com/office/powerpoint/2010/main" val="2593999152"/>
       </p:ext>
     </p:extLst>
   </p:cSld>
@@ -5432,7 +5344,7 @@
         <a:effectLst/>
         <a:extLst>
           <a:ext uri="{AF507438-7753-43e0-B8FC-AC1667EBCBE1}">
-            <a14:hiddenEffects xmlns="" xmlns:a14="http://schemas.microsoft.com/office/drawing/2010/main">
+            <a14:hiddenEffects xmlns:a14="http://schemas.microsoft.com/office/drawing/2010/main" xmlns="">
               <a:effectLst>
                 <a:outerShdw blurRad="63500" dist="38099" dir="2700000" algn="ctr" rotWithShape="0">
                   <a:schemeClr val="bg2">
@@ -5508,7 +5420,7 @@
         <a:effectLst/>
         <a:extLst>
           <a:ext uri="{AF507438-7753-43e0-B8FC-AC1667EBCBE1}">
-            <a14:hiddenEffects xmlns="" xmlns:a14="http://schemas.microsoft.com/office/drawing/2010/main">
+            <a14:hiddenEffects xmlns:a14="http://schemas.microsoft.com/office/drawing/2010/main" xmlns="">
               <a:effectLst>
                 <a:outerShdw blurRad="63500" dist="38099" dir="2700000" algn="ctr" rotWithShape="0">
                   <a:schemeClr val="bg2">

</xml_diff>